<commit_message>
proofing through ms word
</commit_message>
<xml_diff>
--- a/presentation/thesis.pptx
+++ b/presentation/thesis.pptx
@@ -149,9 +149,10 @@
           </c:tx>
           <c:spPr>
             <a:solidFill>
-              <a:srgbClr val="FFFF00">
-                <a:alpha val="47000"/>
-              </a:srgbClr>
+              <a:schemeClr val="accent6">
+                <a:lumMod val="75000"/>
+                <a:alpha val="54000"/>
+              </a:schemeClr>
             </a:solidFill>
             <a:ln>
               <a:solidFill>
@@ -279,7 +280,9 @@
           </c:tx>
           <c:spPr>
             <a:solidFill>
-              <a:schemeClr val="accent2"/>
+              <a:srgbClr val="C00000">
+                <a:alpha val="55000"/>
+              </a:srgbClr>
             </a:solidFill>
             <a:ln>
               <a:noFill/>
@@ -787,16 +790,79 @@
           <c:showPercent val="0"/>
           <c:showBubbleSize val="0"/>
         </c:dLbls>
-        <c:axId val="130113696"/>
-        <c:axId val="130114256"/>
+        <c:axId val="237589872"/>
+        <c:axId val="237590432"/>
       </c:areaChart>
       <c:catAx>
-        <c:axId val="130113696"/>
+        <c:axId val="237589872"/>
         <c:scaling>
           <c:orientation val="minMax"/>
         </c:scaling>
         <c:delete val="0"/>
         <c:axPos val="b"/>
+        <c:title>
+          <c:tx>
+            <c:rich>
+              <a:bodyPr rot="0" spcFirstLastPara="1" vertOverflow="ellipsis" vert="horz" wrap="square" anchor="ctr" anchorCtr="1"/>
+              <a:lstStyle/>
+              <a:p>
+                <a:pPr>
+                  <a:defRPr sz="1600" b="0" i="0" u="none" strike="noStrike" kern="1200" baseline="0">
+                    <a:solidFill>
+                      <a:schemeClr val="tx1">
+                        <a:lumMod val="65000"/>
+                        <a:lumOff val="35000"/>
+                      </a:schemeClr>
+                    </a:solidFill>
+                    <a:latin typeface="+mn-lt"/>
+                    <a:ea typeface="+mn-ea"/>
+                    <a:cs typeface="+mn-cs"/>
+                  </a:defRPr>
+                </a:pPr>
+                <a:r>
+                  <a:rPr lang="en-US" sz="1600"/>
+                  <a:t>Day</a:t>
+                </a:r>
+              </a:p>
+            </c:rich>
+          </c:tx>
+          <c:layout>
+            <c:manualLayout>
+              <c:xMode val="edge"/>
+              <c:yMode val="edge"/>
+              <c:x val="0.54634592605108967"/>
+              <c:y val="0.77854965352068384"/>
+            </c:manualLayout>
+          </c:layout>
+          <c:overlay val="0"/>
+          <c:spPr>
+            <a:noFill/>
+            <a:ln>
+              <a:noFill/>
+            </a:ln>
+            <a:effectLst/>
+          </c:spPr>
+          <c:txPr>
+            <a:bodyPr rot="0" spcFirstLastPara="1" vertOverflow="ellipsis" vert="horz" wrap="square" anchor="ctr" anchorCtr="1"/>
+            <a:lstStyle/>
+            <a:p>
+              <a:pPr>
+                <a:defRPr sz="1600" b="0" i="0" u="none" strike="noStrike" kern="1200" baseline="0">
+                  <a:solidFill>
+                    <a:schemeClr val="tx1">
+                      <a:lumMod val="65000"/>
+                      <a:lumOff val="35000"/>
+                    </a:schemeClr>
+                  </a:solidFill>
+                  <a:latin typeface="+mn-lt"/>
+                  <a:ea typeface="+mn-ea"/>
+                  <a:cs typeface="+mn-cs"/>
+                </a:defRPr>
+              </a:pPr>
+              <a:endParaRPr lang="en-US"/>
+            </a:p>
+          </c:txPr>
+        </c:title>
         <c:majorTickMark val="out"/>
         <c:minorTickMark val="none"/>
         <c:tickLblPos val="nextTo"/>
@@ -818,7 +884,7 @@
           <a:lstStyle/>
           <a:p>
             <a:pPr>
-              <a:defRPr sz="900" b="0" i="0" u="none" strike="noStrike" kern="1200" baseline="0">
+              <a:defRPr sz="1200" b="0" i="0" u="none" strike="noStrike" kern="1200" baseline="0">
                 <a:solidFill>
                   <a:schemeClr val="tx1">
                     <a:lumMod val="65000"/>
@@ -833,7 +899,7 @@
             <a:endParaRPr lang="en-US"/>
           </a:p>
         </c:txPr>
-        <c:crossAx val="130114256"/>
+        <c:crossAx val="237590432"/>
         <c:crosses val="autoZero"/>
         <c:auto val="1"/>
         <c:lblAlgn val="ctr"/>
@@ -841,7 +907,7 @@
         <c:noMultiLvlLbl val="0"/>
       </c:catAx>
       <c:valAx>
-        <c:axId val="130114256"/>
+        <c:axId val="237590432"/>
         <c:scaling>
           <c:orientation val="minMax"/>
         </c:scaling>
@@ -861,6 +927,62 @@
             <a:effectLst/>
           </c:spPr>
         </c:majorGridlines>
+        <c:title>
+          <c:tx>
+            <c:rich>
+              <a:bodyPr rot="-5400000" spcFirstLastPara="1" vertOverflow="ellipsis" vert="horz" wrap="square" anchor="ctr" anchorCtr="1"/>
+              <a:lstStyle/>
+              <a:p>
+                <a:pPr>
+                  <a:defRPr sz="1000" b="0" i="0" u="none" strike="noStrike" kern="1200" baseline="0">
+                    <a:solidFill>
+                      <a:schemeClr val="tx1">
+                        <a:lumMod val="65000"/>
+                        <a:lumOff val="35000"/>
+                      </a:schemeClr>
+                    </a:solidFill>
+                    <a:latin typeface="+mn-lt"/>
+                    <a:ea typeface="+mn-ea"/>
+                    <a:cs typeface="+mn-cs"/>
+                  </a:defRPr>
+                </a:pPr>
+                <a:r>
+                  <a:rPr lang="en-US" sz="1600" dirty="0"/>
+                  <a:t>Tweet count</a:t>
+                </a:r>
+              </a:p>
+            </c:rich>
+          </c:tx>
+          <c:layout/>
+          <c:overlay val="0"/>
+          <c:spPr>
+            <a:noFill/>
+            <a:ln>
+              <a:noFill/>
+            </a:ln>
+            <a:effectLst/>
+          </c:spPr>
+          <c:txPr>
+            <a:bodyPr rot="-5400000" spcFirstLastPara="1" vertOverflow="ellipsis" vert="horz" wrap="square" anchor="ctr" anchorCtr="1"/>
+            <a:lstStyle/>
+            <a:p>
+              <a:pPr>
+                <a:defRPr sz="1000" b="0" i="0" u="none" strike="noStrike" kern="1200" baseline="0">
+                  <a:solidFill>
+                    <a:schemeClr val="tx1">
+                      <a:lumMod val="65000"/>
+                      <a:lumOff val="35000"/>
+                    </a:schemeClr>
+                  </a:solidFill>
+                  <a:latin typeface="+mn-lt"/>
+                  <a:ea typeface="+mn-ea"/>
+                  <a:cs typeface="+mn-cs"/>
+                </a:defRPr>
+              </a:pPr>
+              <a:endParaRPr lang="en-US"/>
+            </a:p>
+          </c:txPr>
+        </c:title>
         <c:numFmt formatCode="General" sourceLinked="1"/>
         <c:majorTickMark val="none"/>
         <c:minorTickMark val="none"/>
@@ -892,7 +1014,7 @@
             <a:endParaRPr lang="en-US"/>
           </a:p>
         </c:txPr>
-        <c:crossAx val="130113696"/>
+        <c:crossAx val="237589872"/>
         <c:crosses val="autoZero"/>
         <c:crossBetween val="midCat"/>
       </c:valAx>
@@ -906,7 +1028,16 @@
     </c:plotArea>
     <c:legend>
       <c:legendPos val="b"/>
-      <c:layout/>
+      <c:layout>
+        <c:manualLayout>
+          <c:xMode val="edge"/>
+          <c:yMode val="edge"/>
+          <c:x val="0.19555031065200659"/>
+          <c:y val="4.1340982363457408E-2"/>
+          <c:w val="0.75250798758171822"/>
+          <c:h val="8.1728137617258903E-2"/>
+        </c:manualLayout>
+      </c:layout>
       <c:overlay val="0"/>
       <c:spPr>
         <a:noFill/>
@@ -920,7 +1051,7 @@
         <a:lstStyle/>
         <a:p>
           <a:pPr>
-            <a:defRPr sz="1800" b="0" i="0" u="none" strike="noStrike" kern="1200" baseline="0">
+            <a:defRPr sz="1400" b="0" i="0" u="none" strike="noStrike" kern="1200" baseline="0">
               <a:solidFill>
                 <a:schemeClr val="tx1">
                   <a:lumMod val="65000"/>
@@ -1655,7 +1786,7 @@
           <a:p>
             <a:fld id="{40A9466D-1D48-456F-8680-1F0B18548100}" type="datetimeFigureOut">
               <a:rPr lang="en-US" smtClean="0"/>
-              <a:t>10/18/2015</a:t>
+              <a:t>10/25/2015</a:t>
             </a:fld>
             <a:endParaRPr lang="en-US"/>
           </a:p>
@@ -1825,7 +1956,7 @@
           <a:p>
             <a:fld id="{40A9466D-1D48-456F-8680-1F0B18548100}" type="datetimeFigureOut">
               <a:rPr lang="en-US" smtClean="0"/>
-              <a:t>10/18/2015</a:t>
+              <a:t>10/25/2015</a:t>
             </a:fld>
             <a:endParaRPr lang="en-US"/>
           </a:p>
@@ -2005,7 +2136,7 @@
           <a:p>
             <a:fld id="{40A9466D-1D48-456F-8680-1F0B18548100}" type="datetimeFigureOut">
               <a:rPr lang="en-US" smtClean="0"/>
-              <a:t>10/18/2015</a:t>
+              <a:t>10/25/2015</a:t>
             </a:fld>
             <a:endParaRPr lang="en-US"/>
           </a:p>
@@ -2175,7 +2306,7 @@
           <a:p>
             <a:fld id="{40A9466D-1D48-456F-8680-1F0B18548100}" type="datetimeFigureOut">
               <a:rPr lang="en-US" smtClean="0"/>
-              <a:t>10/18/2015</a:t>
+              <a:t>10/25/2015</a:t>
             </a:fld>
             <a:endParaRPr lang="en-US"/>
           </a:p>
@@ -2419,7 +2550,7 @@
           <a:p>
             <a:fld id="{40A9466D-1D48-456F-8680-1F0B18548100}" type="datetimeFigureOut">
               <a:rPr lang="en-US" smtClean="0"/>
-              <a:t>10/18/2015</a:t>
+              <a:t>10/25/2015</a:t>
             </a:fld>
             <a:endParaRPr lang="en-US"/>
           </a:p>
@@ -2651,7 +2782,7 @@
           <a:p>
             <a:fld id="{40A9466D-1D48-456F-8680-1F0B18548100}" type="datetimeFigureOut">
               <a:rPr lang="en-US" smtClean="0"/>
-              <a:t>10/18/2015</a:t>
+              <a:t>10/25/2015</a:t>
             </a:fld>
             <a:endParaRPr lang="en-US"/>
           </a:p>
@@ -3018,7 +3149,7 @@
           <a:p>
             <a:fld id="{40A9466D-1D48-456F-8680-1F0B18548100}" type="datetimeFigureOut">
               <a:rPr lang="en-US" smtClean="0"/>
-              <a:t>10/18/2015</a:t>
+              <a:t>10/25/2015</a:t>
             </a:fld>
             <a:endParaRPr lang="en-US"/>
           </a:p>
@@ -3136,7 +3267,7 @@
           <a:p>
             <a:fld id="{40A9466D-1D48-456F-8680-1F0B18548100}" type="datetimeFigureOut">
               <a:rPr lang="en-US" smtClean="0"/>
-              <a:t>10/18/2015</a:t>
+              <a:t>10/25/2015</a:t>
             </a:fld>
             <a:endParaRPr lang="en-US"/>
           </a:p>
@@ -3231,7 +3362,7 @@
           <a:p>
             <a:fld id="{40A9466D-1D48-456F-8680-1F0B18548100}" type="datetimeFigureOut">
               <a:rPr lang="en-US" smtClean="0"/>
-              <a:t>10/18/2015</a:t>
+              <a:t>10/25/2015</a:t>
             </a:fld>
             <a:endParaRPr lang="en-US"/>
           </a:p>
@@ -3508,7 +3639,7 @@
           <a:p>
             <a:fld id="{40A9466D-1D48-456F-8680-1F0B18548100}" type="datetimeFigureOut">
               <a:rPr lang="en-US" smtClean="0"/>
-              <a:t>10/18/2015</a:t>
+              <a:t>10/25/2015</a:t>
             </a:fld>
             <a:endParaRPr lang="en-US"/>
           </a:p>
@@ -3765,7 +3896,7 @@
           <a:p>
             <a:fld id="{40A9466D-1D48-456F-8680-1F0B18548100}" type="datetimeFigureOut">
               <a:rPr lang="en-US" smtClean="0"/>
-              <a:t>10/18/2015</a:t>
+              <a:t>10/25/2015</a:t>
             </a:fld>
             <a:endParaRPr lang="en-US"/>
           </a:p>
@@ -3978,7 +4109,7 @@
           <a:p>
             <a:fld id="{40A9466D-1D48-456F-8680-1F0B18548100}" type="datetimeFigureOut">
               <a:rPr lang="en-US" smtClean="0"/>
-              <a:t>10/18/2015</a:t>
+              <a:t>10/25/2015</a:t>
             </a:fld>
             <a:endParaRPr lang="en-US"/>
           </a:p>
@@ -4491,21 +4622,21 @@
       </p:sp>
       <p:graphicFrame>
         <p:nvGraphicFramePr>
-          <p:cNvPr id="4" name="Chart 3"/>
+          <p:cNvPr id="5" name="Chart 4"/>
           <p:cNvGraphicFramePr>
             <a:graphicFrameLocks/>
           </p:cNvGraphicFramePr>
           <p:nvPr>
             <p:extLst>
               <p:ext uri="{D42A27DB-BD31-4B8C-83A1-F6EECF244321}">
-                <p14:modId xmlns:p14="http://schemas.microsoft.com/office/powerpoint/2010/main" val="2276622211"/>
+                <p14:modId xmlns:p14="http://schemas.microsoft.com/office/powerpoint/2010/main" val="954858769"/>
               </p:ext>
             </p:extLst>
           </p:nvPr>
         </p:nvGraphicFramePr>
         <p:xfrm>
-          <a:off x="1590262" y="2494721"/>
-          <a:ext cx="6215268" cy="3508514"/>
+          <a:off x="1596575" y="2418730"/>
+          <a:ext cx="5758381" cy="3758233"/>
         </p:xfrm>
         <a:graphic>
           <a:graphicData uri="http://schemas.openxmlformats.org/drawingml/2006/chart">

</xml_diff>